<commit_message>
Small changes in second lesson.
</commit_message>
<xml_diff>
--- a/2.Using_Essential_Tools/02-UsingEssentialTools.pptx
+++ b/2.Using_Essential_Tools/02-UsingEssentialTools.pptx
@@ -216,7 +216,7 @@
           <a:p>
             <a:fld id="{BF75ECE4-E962-F444-AA45-989C755D0155}" type="datetimeFigureOut">
               <a:rPr lang="en-US" smtClean="0"/>
-              <a:t>4/5/17</a:t>
+              <a:t>4/6/17</a:t>
             </a:fld>
             <a:endParaRPr lang="en-US"/>
           </a:p>
@@ -833,7 +833,7 @@
           <a:p>
             <a:fld id="{3EA744D9-3FBE-48D8-BF2A-85DF203E4D20}" type="datetimeFigureOut">
               <a:rPr lang="bg-BG" smtClean="0"/>
-              <a:t>5.04.17 г.</a:t>
+              <a:t>6.04.17 г.</a:t>
             </a:fld>
             <a:endParaRPr lang="bg-BG"/>
           </a:p>
@@ -1003,7 +1003,7 @@
           <a:p>
             <a:fld id="{3EA744D9-3FBE-48D8-BF2A-85DF203E4D20}" type="datetimeFigureOut">
               <a:rPr lang="bg-BG" smtClean="0"/>
-              <a:t>5.04.17 г.</a:t>
+              <a:t>6.04.17 г.</a:t>
             </a:fld>
             <a:endParaRPr lang="bg-BG"/>
           </a:p>
@@ -1183,7 +1183,7 @@
           <a:p>
             <a:fld id="{3EA744D9-3FBE-48D8-BF2A-85DF203E4D20}" type="datetimeFigureOut">
               <a:rPr lang="bg-BG" smtClean="0"/>
-              <a:t>5.04.17 г.</a:t>
+              <a:t>6.04.17 г.</a:t>
             </a:fld>
             <a:endParaRPr lang="bg-BG"/>
           </a:p>
@@ -1353,7 +1353,7 @@
           <a:p>
             <a:fld id="{3EA744D9-3FBE-48D8-BF2A-85DF203E4D20}" type="datetimeFigureOut">
               <a:rPr lang="bg-BG" smtClean="0"/>
-              <a:t>5.04.17 г.</a:t>
+              <a:t>6.04.17 г.</a:t>
             </a:fld>
             <a:endParaRPr lang="bg-BG"/>
           </a:p>
@@ -1599,7 +1599,7 @@
           <a:p>
             <a:fld id="{3EA744D9-3FBE-48D8-BF2A-85DF203E4D20}" type="datetimeFigureOut">
               <a:rPr lang="bg-BG" smtClean="0"/>
-              <a:t>5.04.17 г.</a:t>
+              <a:t>6.04.17 г.</a:t>
             </a:fld>
             <a:endParaRPr lang="bg-BG"/>
           </a:p>
@@ -1887,7 +1887,7 @@
           <a:p>
             <a:fld id="{3EA744D9-3FBE-48D8-BF2A-85DF203E4D20}" type="datetimeFigureOut">
               <a:rPr lang="bg-BG" smtClean="0"/>
-              <a:t>5.04.17 г.</a:t>
+              <a:t>6.04.17 г.</a:t>
             </a:fld>
             <a:endParaRPr lang="bg-BG"/>
           </a:p>
@@ -2309,7 +2309,7 @@
           <a:p>
             <a:fld id="{3EA744D9-3FBE-48D8-BF2A-85DF203E4D20}" type="datetimeFigureOut">
               <a:rPr lang="bg-BG" smtClean="0"/>
-              <a:t>5.04.17 г.</a:t>
+              <a:t>6.04.17 г.</a:t>
             </a:fld>
             <a:endParaRPr lang="bg-BG"/>
           </a:p>
@@ -2427,7 +2427,7 @@
           <a:p>
             <a:fld id="{3EA744D9-3FBE-48D8-BF2A-85DF203E4D20}" type="datetimeFigureOut">
               <a:rPr lang="bg-BG" smtClean="0"/>
-              <a:t>5.04.17 г.</a:t>
+              <a:t>6.04.17 г.</a:t>
             </a:fld>
             <a:endParaRPr lang="bg-BG"/>
           </a:p>
@@ -2522,7 +2522,7 @@
           <a:p>
             <a:fld id="{3EA744D9-3FBE-48D8-BF2A-85DF203E4D20}" type="datetimeFigureOut">
               <a:rPr lang="bg-BG" smtClean="0"/>
-              <a:t>5.04.17 г.</a:t>
+              <a:t>6.04.17 г.</a:t>
             </a:fld>
             <a:endParaRPr lang="bg-BG"/>
           </a:p>
@@ -2799,7 +2799,7 @@
           <a:p>
             <a:fld id="{3EA744D9-3FBE-48D8-BF2A-85DF203E4D20}" type="datetimeFigureOut">
               <a:rPr lang="bg-BG" smtClean="0"/>
-              <a:t>5.04.17 г.</a:t>
+              <a:t>6.04.17 г.</a:t>
             </a:fld>
             <a:endParaRPr lang="bg-BG"/>
           </a:p>
@@ -3052,7 +3052,7 @@
           <a:p>
             <a:fld id="{3EA744D9-3FBE-48D8-BF2A-85DF203E4D20}" type="datetimeFigureOut">
               <a:rPr lang="bg-BG" smtClean="0"/>
-              <a:t>5.04.17 г.</a:t>
+              <a:t>6.04.17 г.</a:t>
             </a:fld>
             <a:endParaRPr lang="bg-BG"/>
           </a:p>
@@ -3274,7 +3274,7 @@
           <a:p>
             <a:fld id="{3EA744D9-3FBE-48D8-BF2A-85DF203E4D20}" type="datetimeFigureOut">
               <a:rPr lang="bg-BG" smtClean="0"/>
-              <a:t>5.04.17 г.</a:t>
+              <a:t>6.04.17 г.</a:t>
             </a:fld>
             <a:endParaRPr lang="bg-BG"/>
           </a:p>
@@ -3779,7 +3779,38 @@
                   <a:schemeClr val="bg1"/>
                 </a:solidFill>
               </a:rPr>
-              <a:t>alias v=“vim”</a:t>
+              <a:t>alias v=“vim</a:t>
+            </a:r>
+            <a:r>
+              <a:rPr lang="en-US" dirty="0" smtClean="0">
+                <a:solidFill>
+                  <a:schemeClr val="bg1"/>
+                </a:solidFill>
+              </a:rPr>
+              <a:t>”</a:t>
+            </a:r>
+            <a:br>
+              <a:rPr lang="en-US" dirty="0" smtClean="0">
+                <a:solidFill>
+                  <a:schemeClr val="bg1"/>
+                </a:solidFill>
+              </a:rPr>
+            </a:br>
+            <a:r>
+              <a:rPr lang="en-US" dirty="0" smtClean="0">
+                <a:solidFill>
+                  <a:schemeClr val="accent6"/>
+                </a:solidFill>
+              </a:rPr>
+              <a:t>Reload the shell: </a:t>
+            </a:r>
+            <a:r>
+              <a:rPr lang="en-US" dirty="0" smtClean="0">
+                <a:solidFill>
+                  <a:schemeClr val="bg1"/>
+                </a:solidFill>
+              </a:rPr>
+              <a:t>exec bash</a:t>
             </a:r>
             <a:endParaRPr lang="bg-BG" dirty="0">
               <a:solidFill>
@@ -4163,8 +4194,8 @@
             </a:r>
           </a:p>
           <a:p>
-            <a:pPr marL="0" indent="0">
-              <a:buNone/>
+            <a:pPr marL="514350" indent="-514350">
+              <a:buAutoNum type="arabicPeriod" startAt="3"/>
             </a:pPr>
             <a:r>
               <a:rPr lang="en-US" dirty="0" smtClean="0">
@@ -4172,23 +4203,15 @@
                   <a:schemeClr val="accent6"/>
                 </a:solidFill>
               </a:rPr>
-              <a:t>3</a:t>
-            </a:r>
-            <a:r>
-              <a:rPr lang="en-US" dirty="0" smtClean="0">
-                <a:solidFill>
-                  <a:schemeClr val="bg1"/>
-                </a:solidFill>
-              </a:rPr>
-              <a:t>.     </a:t>
-            </a:r>
-            <a:r>
-              <a:rPr lang="en-US" dirty="0" smtClean="0">
-                <a:solidFill>
-                  <a:schemeClr val="accent6"/>
-                </a:solidFill>
-              </a:rPr>
-              <a:t>Write the following command in the shell ‘</a:t>
+              <a:t>Write </a:t>
+            </a:r>
+            <a:r>
+              <a:rPr lang="en-US" dirty="0" smtClean="0">
+                <a:solidFill>
+                  <a:schemeClr val="accent6"/>
+                </a:solidFill>
+              </a:rPr>
+              <a:t>the following command in the shell ‘</a:t>
             </a:r>
             <a:r>
               <a:rPr lang="en-US" dirty="0" smtClean="0">
@@ -4212,7 +4235,33 @@
                   <a:schemeClr val="accent6"/>
                 </a:solidFill>
               </a:rPr>
-              <a:t>’, what do you think ‘man’ is ? What about ‘</a:t>
+              <a:t>’, what do you think ‘man’ is ? </a:t>
+            </a:r>
+            <a:endParaRPr lang="en-US" dirty="0" smtClean="0">
+              <a:solidFill>
+                <a:schemeClr val="accent6"/>
+              </a:solidFill>
+            </a:endParaRPr>
+          </a:p>
+          <a:p>
+            <a:pPr marL="514350" indent="-514350">
+              <a:buAutoNum type="arabicPeriod" startAt="3"/>
+            </a:pPr>
+            <a:r>
+              <a:rPr lang="en-US" dirty="0" smtClean="0">
+                <a:solidFill>
+                  <a:schemeClr val="accent6"/>
+                </a:solidFill>
+              </a:rPr>
+              <a:t>What </a:t>
+            </a:r>
+            <a:r>
+              <a:rPr lang="en-US" dirty="0" smtClean="0">
+                <a:solidFill>
+                  <a:schemeClr val="accent6"/>
+                </a:solidFill>
+              </a:rPr>
+              <a:t>about ‘</a:t>
             </a:r>
             <a:r>
               <a:rPr lang="en-US" dirty="0" err="1" smtClean="0">
@@ -4228,7 +4277,23 @@
                   <a:schemeClr val="accent6"/>
                 </a:solidFill>
               </a:rPr>
-              <a:t>’?</a:t>
+              <a:t>’? Ask ‘</a:t>
+            </a:r>
+            <a:r>
+              <a:rPr lang="en-US" dirty="0" err="1" smtClean="0">
+                <a:solidFill>
+                  <a:schemeClr val="accent6"/>
+                </a:solidFill>
+              </a:rPr>
+              <a:t>whatis</a:t>
+            </a:r>
+            <a:r>
+              <a:rPr lang="en-US" dirty="0" smtClean="0">
+                <a:solidFill>
+                  <a:schemeClr val="accent6"/>
+                </a:solidFill>
+              </a:rPr>
+              <a:t>’ ? </a:t>
             </a:r>
             <a:endParaRPr lang="en-US" dirty="0"/>
           </a:p>
@@ -4343,7 +4408,7 @@
         </p:spPr>
         <p:txBody>
           <a:bodyPr>
-            <a:normAutofit fontScale="55000" lnSpcReduction="20000"/>
+            <a:normAutofit fontScale="62500" lnSpcReduction="20000"/>
           </a:bodyPr>
           <a:lstStyle/>
           <a:p>
@@ -4444,39 +4509,17 @@
                   </a:schemeClr>
                 </a:solidFill>
               </a:rPr>
-              <a:t>#!/bin/</a:t>
-            </a:r>
-            <a:r>
-              <a:rPr lang="en-US" dirty="0" err="1" smtClean="0">
+              <a:t>cat </a:t>
+            </a:r>
+            <a:r>
+              <a:rPr lang="en-US" dirty="0" smtClean="0">
                 <a:solidFill>
                   <a:schemeClr val="bg1">
                     <a:lumMod val="95000"/>
                   </a:schemeClr>
                 </a:solidFill>
               </a:rPr>
-              <a:t>sh</a:t>
-            </a:r>
-            <a:endParaRPr lang="en-US" dirty="0" smtClean="0">
-              <a:solidFill>
-                <a:schemeClr val="bg1">
-                  <a:lumMod val="95000"/>
-                </a:schemeClr>
-              </a:solidFill>
-            </a:endParaRPr>
-          </a:p>
-          <a:p>
-            <a:pPr marL="0" indent="0">
-              <a:buNone/>
-            </a:pPr>
-            <a:r>
-              <a:rPr lang="en-US" dirty="0" smtClean="0">
-                <a:solidFill>
-                  <a:schemeClr val="bg1">
-                    <a:lumMod val="95000"/>
-                  </a:schemeClr>
-                </a:solidFill>
-              </a:rPr>
-              <a:t>cat –</a:t>
+              <a:t>–</a:t>
             </a:r>
           </a:p>
           <a:p>
@@ -5765,7 +5808,7 @@
         </p:nvSpPr>
         <p:spPr>
           <a:xfrm>
-            <a:off x="762000" y="706437"/>
+            <a:off x="533400" y="609600"/>
             <a:ext cx="8229600" cy="1143000"/>
           </a:xfrm>
         </p:spPr>
@@ -6222,15 +6265,7 @@
                   <a:schemeClr val="accent6"/>
                 </a:solidFill>
               </a:rPr>
-              <a:t> database that needs to be updated in special cases</a:t>
-            </a:r>
-            <a:r>
-              <a:rPr lang="en-US" sz="3100" dirty="0" smtClean="0">
-                <a:solidFill>
-                  <a:schemeClr val="accent6"/>
-                </a:solidFill>
-              </a:rPr>
-              <a:t>.</a:t>
+              <a:t> database that needs to be updated in special cases.</a:t>
             </a:r>
             <a:br>
               <a:rPr lang="en-US" sz="3100" dirty="0" smtClean="0">
@@ -6333,14 +6368,6 @@
                 </a:solidFill>
               </a:rPr>
               <a:t>’. </a:t>
-            </a:r>
-            <a:r>
-              <a:rPr lang="en-US" sz="3100" dirty="0" smtClean="0">
-                <a:solidFill>
-                  <a:schemeClr val="accent6"/>
-                </a:solidFill>
-              </a:rPr>
-              <a:t/>
             </a:r>
             <a:br>
               <a:rPr lang="en-US" sz="3100" dirty="0" smtClean="0">
@@ -6754,8 +6781,37 @@
                   <a:schemeClr val="bg1"/>
                 </a:solidFill>
               </a:rPr>
-              <a:t> | grep -i EXT</a:t>
-            </a:r>
+              <a:t> | grep -</a:t>
+            </a:r>
+            <a:r>
+              <a:rPr lang="en-US" err="1" smtClean="0">
+                <a:solidFill>
+                  <a:schemeClr val="bg1"/>
+                </a:solidFill>
+              </a:rPr>
+              <a:t>i</a:t>
+            </a:r>
+            <a:r>
+              <a:rPr lang="en-US" smtClean="0">
+                <a:solidFill>
+                  <a:schemeClr val="bg1"/>
+                </a:solidFill>
+              </a:rPr>
+              <a:t> </a:t>
+            </a:r>
+            <a:r>
+              <a:rPr lang="en-US" smtClean="0">
+                <a:solidFill>
+                  <a:schemeClr val="bg1"/>
+                </a:solidFill>
+              </a:rPr>
+              <a:t>Xfs</a:t>
+            </a:r>
+            <a:endParaRPr lang="en-US" dirty="0" smtClean="0">
+              <a:solidFill>
+                <a:schemeClr val="bg1"/>
+              </a:solidFill>
+            </a:endParaRPr>
           </a:p>
           <a:p>
             <a:pPr marL="0" indent="0">

</xml_diff>